<commit_message>
Diagrama de Arquitetura finalizado
</commit_message>
<xml_diff>
--- a/documentacao/ArquiteturaDeSolucao/V1.pptx
+++ b/documentacao/ArquiteturaDeSolucao/V1.pptx
@@ -259,7 +259,7 @@
           <a:p>
             <a:fld id="{7CFF3949-446E-40E8-B451-13AA7A5CEF4B}" type="datetimeFigureOut">
               <a:rPr lang="pt-BR" smtClean="0"/>
-              <a:t>12/10/2020</a:t>
+              <a:t>20/10/2020</a:t>
             </a:fld>
             <a:endParaRPr lang="pt-BR"/>
           </a:p>
@@ -457,7 +457,7 @@
           <a:p>
             <a:fld id="{7CFF3949-446E-40E8-B451-13AA7A5CEF4B}" type="datetimeFigureOut">
               <a:rPr lang="pt-BR" smtClean="0"/>
-              <a:t>12/10/2020</a:t>
+              <a:t>20/10/2020</a:t>
             </a:fld>
             <a:endParaRPr lang="pt-BR"/>
           </a:p>
@@ -665,7 +665,7 @@
           <a:p>
             <a:fld id="{7CFF3949-446E-40E8-B451-13AA7A5CEF4B}" type="datetimeFigureOut">
               <a:rPr lang="pt-BR" smtClean="0"/>
-              <a:t>12/10/2020</a:t>
+              <a:t>20/10/2020</a:t>
             </a:fld>
             <a:endParaRPr lang="pt-BR"/>
           </a:p>
@@ -863,7 +863,7 @@
           <a:p>
             <a:fld id="{7CFF3949-446E-40E8-B451-13AA7A5CEF4B}" type="datetimeFigureOut">
               <a:rPr lang="pt-BR" smtClean="0"/>
-              <a:t>12/10/2020</a:t>
+              <a:t>20/10/2020</a:t>
             </a:fld>
             <a:endParaRPr lang="pt-BR"/>
           </a:p>
@@ -1138,7 +1138,7 @@
           <a:p>
             <a:fld id="{7CFF3949-446E-40E8-B451-13AA7A5CEF4B}" type="datetimeFigureOut">
               <a:rPr lang="pt-BR" smtClean="0"/>
-              <a:t>12/10/2020</a:t>
+              <a:t>20/10/2020</a:t>
             </a:fld>
             <a:endParaRPr lang="pt-BR"/>
           </a:p>
@@ -1403,7 +1403,7 @@
           <a:p>
             <a:fld id="{7CFF3949-446E-40E8-B451-13AA7A5CEF4B}" type="datetimeFigureOut">
               <a:rPr lang="pt-BR" smtClean="0"/>
-              <a:t>12/10/2020</a:t>
+              <a:t>20/10/2020</a:t>
             </a:fld>
             <a:endParaRPr lang="pt-BR"/>
           </a:p>
@@ -1815,7 +1815,7 @@
           <a:p>
             <a:fld id="{7CFF3949-446E-40E8-B451-13AA7A5CEF4B}" type="datetimeFigureOut">
               <a:rPr lang="pt-BR" smtClean="0"/>
-              <a:t>12/10/2020</a:t>
+              <a:t>20/10/2020</a:t>
             </a:fld>
             <a:endParaRPr lang="pt-BR"/>
           </a:p>
@@ -1956,7 +1956,7 @@
           <a:p>
             <a:fld id="{7CFF3949-446E-40E8-B451-13AA7A5CEF4B}" type="datetimeFigureOut">
               <a:rPr lang="pt-BR" smtClean="0"/>
-              <a:t>12/10/2020</a:t>
+              <a:t>20/10/2020</a:t>
             </a:fld>
             <a:endParaRPr lang="pt-BR"/>
           </a:p>
@@ -2069,7 +2069,7 @@
           <a:p>
             <a:fld id="{7CFF3949-446E-40E8-B451-13AA7A5CEF4B}" type="datetimeFigureOut">
               <a:rPr lang="pt-BR" smtClean="0"/>
-              <a:t>12/10/2020</a:t>
+              <a:t>20/10/2020</a:t>
             </a:fld>
             <a:endParaRPr lang="pt-BR"/>
           </a:p>
@@ -2380,7 +2380,7 @@
           <a:p>
             <a:fld id="{7CFF3949-446E-40E8-B451-13AA7A5CEF4B}" type="datetimeFigureOut">
               <a:rPr lang="pt-BR" smtClean="0"/>
-              <a:t>12/10/2020</a:t>
+              <a:t>20/10/2020</a:t>
             </a:fld>
             <a:endParaRPr lang="pt-BR"/>
           </a:p>
@@ -2668,7 +2668,7 @@
           <a:p>
             <a:fld id="{7CFF3949-446E-40E8-B451-13AA7A5CEF4B}" type="datetimeFigureOut">
               <a:rPr lang="pt-BR" smtClean="0"/>
-              <a:t>12/10/2020</a:t>
+              <a:t>20/10/2020</a:t>
             </a:fld>
             <a:endParaRPr lang="pt-BR"/>
           </a:p>
@@ -2909,7 +2909,7 @@
           <a:p>
             <a:fld id="{7CFF3949-446E-40E8-B451-13AA7A5CEF4B}" type="datetimeFigureOut">
               <a:rPr lang="pt-BR" smtClean="0"/>
-              <a:t>12/10/2020</a:t>
+              <a:t>20/10/2020</a:t>
             </a:fld>
             <a:endParaRPr lang="pt-BR"/>
           </a:p>
@@ -3328,10 +3328,10 @@
       </p:grpSpPr>
       <p:sp>
         <p:nvSpPr>
-          <p:cNvPr id="7" name="Retângulo: Cantos Arredondados 6">
-            <a:extLst>
-              <a:ext uri="{FF2B5EF4-FFF2-40B4-BE49-F238E27FC236}">
-                <a16:creationId xmlns:a16="http://schemas.microsoft.com/office/drawing/2014/main" id="{9F50B4A6-B579-46FB-B2DF-624271008FF2}"/>
+          <p:cNvPr id="8" name="Fluxograma: Armazenamento de Acesso Direto 7">
+            <a:extLst>
+              <a:ext uri="{FF2B5EF4-FFF2-40B4-BE49-F238E27FC236}">
+                <a16:creationId xmlns:a16="http://schemas.microsoft.com/office/drawing/2014/main" id="{627218BA-4D12-46C3-BBA0-50D21A4090E5}"/>
               </a:ext>
             </a:extLst>
           </p:cNvPr>
@@ -3339,113 +3339,20 @@
           <p:nvPr/>
         </p:nvSpPr>
         <p:spPr>
-          <a:xfrm>
-            <a:off x="5054004" y="3689997"/>
-            <a:ext cx="2973464" cy="1861931"/>
-          </a:xfrm>
-          <a:prstGeom prst="roundRect">
-            <a:avLst>
-              <a:gd name="adj" fmla="val 5145"/>
-            </a:avLst>
-          </a:prstGeom>
-          <a:solidFill>
-            <a:schemeClr val="accent1">
-              <a:lumMod val="60000"/>
-              <a:lumOff val="40000"/>
-            </a:schemeClr>
-          </a:solidFill>
-          <a:ln>
-            <a:solidFill>
-              <a:schemeClr val="accent1">
-                <a:lumMod val="75000"/>
-              </a:schemeClr>
-            </a:solidFill>
-            <a:prstDash val="solid"/>
-          </a:ln>
-        </p:spPr>
-        <p:style>
-          <a:lnRef idx="2">
-            <a:schemeClr val="accent1">
-              <a:shade val="50000"/>
-            </a:schemeClr>
-          </a:lnRef>
-          <a:fillRef idx="1">
-            <a:schemeClr val="accent1"/>
-          </a:fillRef>
-          <a:effectRef idx="0">
-            <a:schemeClr val="accent1"/>
-          </a:effectRef>
-          <a:fontRef idx="minor">
-            <a:schemeClr val="lt1"/>
-          </a:fontRef>
-        </p:style>
-        <p:txBody>
-          <a:bodyPr rtlCol="0" anchor="ctr"/>
-          <a:lstStyle/>
-          <a:p>
-            <a:pPr algn="ctr"/>
-            <a:r>
-              <a:rPr lang="pt-BR" sz="2400" dirty="0"/>
-              <a:t>Aplicação Mobile</a:t>
-            </a:r>
-          </a:p>
-          <a:p>
-            <a:pPr algn="ctr"/>
-            <a:r>
-              <a:rPr lang="pt-BR" sz="1600" dirty="0"/>
-              <a:t>(Container: Swift)</a:t>
-            </a:r>
-          </a:p>
-          <a:p>
-            <a:pPr algn="ctr"/>
-            <a:endParaRPr lang="pt-BR" sz="1400" dirty="0"/>
-          </a:p>
-          <a:p>
-            <a:pPr algn="ctr"/>
-            <a:endParaRPr lang="pt-BR" sz="1400" dirty="0"/>
-          </a:p>
-          <a:p>
-            <a:pPr algn="ctr"/>
-            <a:r>
-              <a:rPr lang="pt-BR" sz="1600" dirty="0"/>
-              <a:t>Alugar e disponibilizar garagens </a:t>
-            </a:r>
-          </a:p>
-          <a:p>
-            <a:pPr algn="ctr"/>
-            <a:endParaRPr lang="pt-BR" dirty="0"/>
-          </a:p>
-        </p:txBody>
-      </p:sp>
-      <p:sp>
-        <p:nvSpPr>
-          <p:cNvPr id="8" name="Fluxograma: Armazenamento de Acesso Direto 7">
-            <a:extLst>
-              <a:ext uri="{FF2B5EF4-FFF2-40B4-BE49-F238E27FC236}">
-                <a16:creationId xmlns:a16="http://schemas.microsoft.com/office/drawing/2014/main" id="{627218BA-4D12-46C3-BBA0-50D21A4090E5}"/>
-              </a:ext>
-            </a:extLst>
-          </p:cNvPr>
-          <p:cNvSpPr/>
-          <p:nvPr/>
-        </p:nvSpPr>
-        <p:spPr>
           <a:xfrm rot="16200000">
-            <a:off x="923952" y="-320631"/>
-            <a:ext cx="2594110" cy="3778707"/>
+            <a:off x="1308090" y="63506"/>
+            <a:ext cx="2594110" cy="3010431"/>
           </a:xfrm>
           <a:prstGeom prst="flowChartMagneticDrum">
             <a:avLst/>
           </a:prstGeom>
           <a:solidFill>
-            <a:schemeClr val="tx2">
-              <a:lumMod val="75000"/>
-            </a:schemeClr>
+            <a:schemeClr val="tx2"/>
           </a:solidFill>
           <a:ln>
             <a:solidFill>
               <a:schemeClr val="tx2">
-                <a:lumMod val="50000"/>
+                <a:lumMod val="75000"/>
               </a:schemeClr>
             </a:solidFill>
           </a:ln>
@@ -3477,10 +3384,10 @@
       </p:sp>
       <p:sp>
         <p:nvSpPr>
-          <p:cNvPr id="9" name="Retângulo: Cantos Arredondados 8">
-            <a:extLst>
-              <a:ext uri="{FF2B5EF4-FFF2-40B4-BE49-F238E27FC236}">
-                <a16:creationId xmlns:a16="http://schemas.microsoft.com/office/drawing/2014/main" id="{EFB8A731-8C7A-48D6-A384-04203AE1FA77}"/>
+          <p:cNvPr id="11" name="Retângulo: Cantos Arredondados 10">
+            <a:extLst>
+              <a:ext uri="{FF2B5EF4-FFF2-40B4-BE49-F238E27FC236}">
+                <a16:creationId xmlns:a16="http://schemas.microsoft.com/office/drawing/2014/main" id="{9EEDFED0-3750-47BE-9111-CFA618654BF2}"/>
               </a:ext>
             </a:extLst>
           </p:cNvPr>
@@ -3489,203 +3396,8 @@
         </p:nvSpPr>
         <p:spPr>
           <a:xfrm>
-            <a:off x="6313382" y="758058"/>
-            <a:ext cx="3942519" cy="1861931"/>
-          </a:xfrm>
-          <a:prstGeom prst="roundRect">
-            <a:avLst>
-              <a:gd name="adj" fmla="val 5145"/>
-            </a:avLst>
-          </a:prstGeom>
-          <a:solidFill>
-            <a:schemeClr val="accent1">
-              <a:lumMod val="60000"/>
-              <a:lumOff val="40000"/>
-            </a:schemeClr>
-          </a:solidFill>
-          <a:ln>
-            <a:solidFill>
-              <a:schemeClr val="accent1">
-                <a:lumMod val="75000"/>
-              </a:schemeClr>
-            </a:solidFill>
-            <a:prstDash val="solid"/>
-          </a:ln>
-        </p:spPr>
-        <p:style>
-          <a:lnRef idx="2">
-            <a:schemeClr val="accent1">
-              <a:shade val="50000"/>
-            </a:schemeClr>
-          </a:lnRef>
-          <a:fillRef idx="1">
-            <a:schemeClr val="accent1"/>
-          </a:fillRef>
-          <a:effectRef idx="0">
-            <a:schemeClr val="accent1"/>
-          </a:effectRef>
-          <a:fontRef idx="minor">
-            <a:schemeClr val="lt1"/>
-          </a:fontRef>
-        </p:style>
-        <p:txBody>
-          <a:bodyPr rtlCol="0" anchor="ctr"/>
-          <a:lstStyle/>
-          <a:p>
-            <a:pPr algn="ctr"/>
-            <a:r>
-              <a:rPr lang="pt-BR" sz="2400" dirty="0"/>
-              <a:t>API</a:t>
-            </a:r>
-            <a:endParaRPr lang="pt-BR" dirty="0"/>
-          </a:p>
-          <a:p>
-            <a:pPr algn="ctr"/>
-            <a:r>
-              <a:rPr lang="pt-BR" sz="1600" dirty="0"/>
-              <a:t>(Container: Spring Boot)</a:t>
-            </a:r>
-          </a:p>
-          <a:p>
-            <a:pPr algn="ctr"/>
-            <a:endParaRPr lang="pt-BR" sz="1400" dirty="0"/>
-          </a:p>
-          <a:p>
-            <a:pPr algn="ctr"/>
-            <a:r>
-              <a:rPr lang="pt-BR" sz="1600" dirty="0"/>
-              <a:t>Buscar, inserir e autenticar dados</a:t>
-            </a:r>
-          </a:p>
-          <a:p>
-            <a:pPr algn="ctr"/>
-            <a:endParaRPr lang="pt-BR" dirty="0"/>
-          </a:p>
-        </p:txBody>
-      </p:sp>
-      <p:sp>
-        <p:nvSpPr>
-          <p:cNvPr id="10" name="Retângulo: Cantos Arredondados 9">
-            <a:extLst>
-              <a:ext uri="{FF2B5EF4-FFF2-40B4-BE49-F238E27FC236}">
-                <a16:creationId xmlns:a16="http://schemas.microsoft.com/office/drawing/2014/main" id="{864D8C40-07CA-4CFB-9B42-76721A0D8ACE}"/>
-              </a:ext>
-            </a:extLst>
-          </p:cNvPr>
-          <p:cNvSpPr/>
-          <p:nvPr/>
-        </p:nvSpPr>
-        <p:spPr>
-          <a:xfrm>
-            <a:off x="8258873" y="3682643"/>
-            <a:ext cx="3025000" cy="1861931"/>
-          </a:xfrm>
-          <a:prstGeom prst="roundRect">
-            <a:avLst>
-              <a:gd name="adj" fmla="val 5145"/>
-            </a:avLst>
-          </a:prstGeom>
-          <a:solidFill>
-            <a:schemeClr val="accent1">
-              <a:lumMod val="60000"/>
-              <a:lumOff val="40000"/>
-            </a:schemeClr>
-          </a:solidFill>
-          <a:ln>
-            <a:solidFill>
-              <a:schemeClr val="accent1">
-                <a:lumMod val="75000"/>
-              </a:schemeClr>
-            </a:solidFill>
-            <a:prstDash val="solid"/>
-          </a:ln>
-        </p:spPr>
-        <p:style>
-          <a:lnRef idx="2">
-            <a:schemeClr val="accent1">
-              <a:shade val="50000"/>
-            </a:schemeClr>
-          </a:lnRef>
-          <a:fillRef idx="1">
-            <a:schemeClr val="accent1"/>
-          </a:fillRef>
-          <a:effectRef idx="0">
-            <a:schemeClr val="accent1"/>
-          </a:effectRef>
-          <a:fontRef idx="minor">
-            <a:schemeClr val="lt1"/>
-          </a:fontRef>
-        </p:style>
-        <p:txBody>
-          <a:bodyPr rtlCol="0" anchor="ctr"/>
-          <a:lstStyle/>
-          <a:p>
-            <a:pPr algn="ctr"/>
-            <a:r>
-              <a:rPr lang="pt-BR" sz="2400" dirty="0" err="1"/>
-              <a:t>Client</a:t>
-            </a:r>
-            <a:r>
-              <a:rPr lang="pt-BR" sz="2400" dirty="0"/>
-              <a:t> </a:t>
-            </a:r>
-            <a:r>
-              <a:rPr lang="pt-BR" sz="2400" dirty="0" err="1"/>
-              <a:t>Side</a:t>
-            </a:r>
-            <a:r>
-              <a:rPr lang="pt-BR" sz="2400" dirty="0"/>
-              <a:t> Web</a:t>
-            </a:r>
-          </a:p>
-          <a:p>
-            <a:pPr algn="ctr"/>
-            <a:r>
-              <a:rPr lang="pt-BR" sz="1600" dirty="0"/>
-              <a:t>(Container: </a:t>
-            </a:r>
-            <a:r>
-              <a:rPr lang="pt-BR" sz="1600" dirty="0" err="1"/>
-              <a:t>ReactJs</a:t>
-            </a:r>
-            <a:r>
-              <a:rPr lang="pt-BR" sz="1600" dirty="0"/>
-              <a:t>)</a:t>
-            </a:r>
-          </a:p>
-          <a:p>
-            <a:pPr algn="ctr"/>
-            <a:endParaRPr lang="pt-BR" dirty="0"/>
-          </a:p>
-          <a:p>
-            <a:pPr algn="ctr"/>
-            <a:r>
-              <a:rPr lang="pt-BR" sz="1600" dirty="0"/>
-              <a:t>Alugar e disponibilizar garagens</a:t>
-            </a:r>
-          </a:p>
-          <a:p>
-            <a:pPr algn="ctr"/>
-            <a:endParaRPr lang="pt-BR" dirty="0"/>
-          </a:p>
-        </p:txBody>
-      </p:sp>
-      <p:sp>
-        <p:nvSpPr>
-          <p:cNvPr id="11" name="Retângulo: Cantos Arredondados 10">
-            <a:extLst>
-              <a:ext uri="{FF2B5EF4-FFF2-40B4-BE49-F238E27FC236}">
-                <a16:creationId xmlns:a16="http://schemas.microsoft.com/office/drawing/2014/main" id="{9EEDFED0-3750-47BE-9111-CFA618654BF2}"/>
-              </a:ext>
-            </a:extLst>
-          </p:cNvPr>
-          <p:cNvSpPr/>
-          <p:nvPr/>
-        </p:nvSpPr>
-        <p:spPr>
-          <a:xfrm>
-            <a:off x="4626137" y="85513"/>
-            <a:ext cx="6911008" cy="5769540"/>
+            <a:off x="5897217" y="85514"/>
+            <a:ext cx="6056244" cy="4800120"/>
           </a:xfrm>
           <a:prstGeom prst="roundRect">
             <a:avLst>
@@ -3736,8 +3448,8 @@
         </p:nvSpPr>
         <p:spPr>
           <a:xfrm>
-            <a:off x="5043372" y="298496"/>
-            <a:ext cx="4533715" cy="461665"/>
+            <a:off x="6215270" y="142236"/>
+            <a:ext cx="4052716" cy="461665"/>
           </a:xfrm>
           <a:prstGeom prst="rect">
             <a:avLst/>
@@ -3751,7 +3463,9 @@
           <a:lstStyle/>
           <a:p>
             <a:r>
-              <a:rPr lang="pt-BR" sz="2400" dirty="0"/>
+              <a:rPr lang="pt-BR" sz="2400" dirty="0">
+                <a:latin typeface="Corbel" panose="020B0503020204020204" pitchFamily="34" charset="0"/>
+              </a:rPr>
               <a:t>Aplicação WEB</a:t>
             </a:r>
           </a:p>
@@ -3771,8 +3485,8 @@
         </p:nvSpPr>
         <p:spPr>
           <a:xfrm>
-            <a:off x="420905" y="1173439"/>
-            <a:ext cx="3525721" cy="1446550"/>
+            <a:off x="1183884" y="1125980"/>
+            <a:ext cx="2808881" cy="1692771"/>
           </a:xfrm>
           <a:prstGeom prst="rect">
             <a:avLst/>
@@ -3787,17 +3501,19 @@
           <a:p>
             <a:pPr algn="ctr"/>
             <a:r>
-              <a:rPr lang="pt-BR" sz="2400" dirty="0" err="1">
+              <a:rPr lang="pt-BR" sz="2400" b="1" dirty="0" err="1">
                 <a:solidFill>
                   <a:schemeClr val="bg1"/>
                 </a:solidFill>
+                <a:latin typeface="Corbel" panose="020B0503020204020204" pitchFamily="34" charset="0"/>
               </a:rPr>
               <a:t>Database</a:t>
             </a:r>
-            <a:endParaRPr lang="pt-BR" sz="1600" dirty="0">
+            <a:endParaRPr lang="pt-BR" sz="1600" b="1" dirty="0">
               <a:solidFill>
                 <a:schemeClr val="bg1"/>
               </a:solidFill>
+              <a:latin typeface="Corbel" panose="020B0503020204020204" pitchFamily="34" charset="0"/>
             </a:endParaRPr>
           </a:p>
           <a:p>
@@ -3807,6 +3523,7 @@
                 <a:solidFill>
                   <a:schemeClr val="bg1"/>
                 </a:solidFill>
+                <a:latin typeface="Corbel" panose="020B0503020204020204" pitchFamily="34" charset="0"/>
               </a:rPr>
               <a:t>(Container: SQL Server)</a:t>
             </a:r>
@@ -3817,6 +3534,7 @@
               <a:solidFill>
                 <a:schemeClr val="bg1"/>
               </a:solidFill>
+              <a:latin typeface="Corbel" panose="020B0503020204020204" pitchFamily="34" charset="0"/>
             </a:endParaRPr>
           </a:p>
           <a:p>
@@ -3826,6 +3544,7 @@
                 <a:solidFill>
                   <a:schemeClr val="bg1"/>
                 </a:solidFill>
+                <a:latin typeface="Corbel" panose="020B0503020204020204" pitchFamily="34" charset="0"/>
               </a:rPr>
               <a:t>Armazena os dados dos usuários, garagens, anúncios, alugueis</a:t>
             </a:r>
@@ -3846,21 +3565,19 @@
         </p:nvSpPr>
         <p:spPr>
           <a:xfrm rot="16200000">
-            <a:off x="532128" y="3852641"/>
-            <a:ext cx="2594110" cy="2873274"/>
+            <a:off x="233473" y="4040711"/>
+            <a:ext cx="2650437" cy="2440809"/>
           </a:xfrm>
           <a:prstGeom prst="flowChartMagneticDrum">
             <a:avLst/>
           </a:prstGeom>
           <a:solidFill>
-            <a:schemeClr val="tx2">
-              <a:lumMod val="75000"/>
-            </a:schemeClr>
+            <a:schemeClr val="tx2"/>
           </a:solidFill>
           <a:ln>
             <a:solidFill>
               <a:schemeClr val="tx2">
-                <a:lumMod val="50000"/>
+                <a:lumMod val="75000"/>
               </a:schemeClr>
             </a:solidFill>
           </a:ln>
@@ -3904,8 +3621,8 @@
         </p:nvSpPr>
         <p:spPr>
           <a:xfrm>
-            <a:off x="546548" y="4938828"/>
-            <a:ext cx="2451498" cy="1446550"/>
+            <a:off x="517433" y="4795159"/>
+            <a:ext cx="2082516" cy="1692771"/>
           </a:xfrm>
           <a:prstGeom prst="rect">
             <a:avLst/>
@@ -3924,6 +3641,7 @@
                 <a:solidFill>
                   <a:schemeClr val="bg1"/>
                 </a:solidFill>
+                <a:latin typeface="Corbel" panose="020B0503020204020204" pitchFamily="34" charset="0"/>
               </a:rPr>
               <a:t>Database</a:t>
             </a:r>
@@ -3932,6 +3650,7 @@
                 <a:solidFill>
                   <a:schemeClr val="bg1"/>
                 </a:solidFill>
+                <a:latin typeface="Corbel" panose="020B0503020204020204" pitchFamily="34" charset="0"/>
               </a:rPr>
               <a:t> Chat </a:t>
             </a:r>
@@ -3939,6 +3658,7 @@
               <a:solidFill>
                 <a:schemeClr val="bg1"/>
               </a:solidFill>
+              <a:latin typeface="Corbel" panose="020B0503020204020204" pitchFamily="34" charset="0"/>
             </a:endParaRPr>
           </a:p>
           <a:p>
@@ -3948,6 +3668,7 @@
                 <a:solidFill>
                   <a:schemeClr val="bg1"/>
                 </a:solidFill>
+                <a:latin typeface="Corbel" panose="020B0503020204020204" pitchFamily="34" charset="0"/>
               </a:rPr>
               <a:t>(Container: </a:t>
             </a:r>
@@ -3956,6 +3677,7 @@
                 <a:solidFill>
                   <a:schemeClr val="bg1"/>
                 </a:solidFill>
+                <a:latin typeface="Corbel" panose="020B0503020204020204" pitchFamily="34" charset="0"/>
               </a:rPr>
               <a:t>Firebase</a:t>
             </a:r>
@@ -3964,6 +3686,7 @@
                 <a:solidFill>
                   <a:schemeClr val="bg1"/>
                 </a:solidFill>
+                <a:latin typeface="Corbel" panose="020B0503020204020204" pitchFamily="34" charset="0"/>
               </a:rPr>
               <a:t>)</a:t>
             </a:r>
@@ -3974,6 +3697,7 @@
               <a:solidFill>
                 <a:schemeClr val="bg1"/>
               </a:solidFill>
+              <a:latin typeface="Corbel" panose="020B0503020204020204" pitchFamily="34" charset="0"/>
             </a:endParaRPr>
           </a:p>
           <a:p>
@@ -3983,36 +3707,719 @@
                 <a:solidFill>
                   <a:schemeClr val="bg1"/>
                 </a:solidFill>
+                <a:latin typeface="Corbel" panose="020B0503020204020204" pitchFamily="34" charset="0"/>
               </a:rPr>
               <a:t>Armazenar as conversar entre os usuários</a:t>
             </a:r>
           </a:p>
         </p:txBody>
       </p:sp>
+      <p:sp>
+        <p:nvSpPr>
+          <p:cNvPr id="2" name="Retângulo: Cantos Arredondados 1">
+            <a:extLst>
+              <a:ext uri="{FF2B5EF4-FFF2-40B4-BE49-F238E27FC236}">
+                <a16:creationId xmlns:a16="http://schemas.microsoft.com/office/drawing/2014/main" id="{866ACF9B-B7D4-4C3B-AD17-23C057B0DF3F}"/>
+              </a:ext>
+            </a:extLst>
+          </p:cNvPr>
+          <p:cNvSpPr/>
+          <p:nvPr/>
+        </p:nvSpPr>
+        <p:spPr>
+          <a:xfrm>
+            <a:off x="118478" y="3217224"/>
+            <a:ext cx="5578891" cy="3476026"/>
+          </a:xfrm>
+          <a:prstGeom prst="roundRect">
+            <a:avLst>
+              <a:gd name="adj" fmla="val 5145"/>
+            </a:avLst>
+          </a:prstGeom>
+          <a:noFill/>
+          <a:ln>
+            <a:prstDash val="sysDash"/>
+          </a:ln>
+        </p:spPr>
+        <p:style>
+          <a:lnRef idx="2">
+            <a:schemeClr val="accent1">
+              <a:shade val="50000"/>
+            </a:schemeClr>
+          </a:lnRef>
+          <a:fillRef idx="1">
+            <a:schemeClr val="accent1"/>
+          </a:fillRef>
+          <a:effectRef idx="0">
+            <a:schemeClr val="accent1"/>
+          </a:effectRef>
+          <a:fontRef idx="minor">
+            <a:schemeClr val="lt1"/>
+          </a:fontRef>
+        </p:style>
+        <p:txBody>
+          <a:bodyPr rtlCol="0" anchor="ctr"/>
+          <a:lstStyle/>
+          <a:p>
+            <a:pPr algn="ctr"/>
+            <a:endParaRPr lang="pt-BR" dirty="0"/>
+          </a:p>
+        </p:txBody>
+      </p:sp>
+      <p:sp>
+        <p:nvSpPr>
+          <p:cNvPr id="3" name="Retângulo 2">
+            <a:extLst>
+              <a:ext uri="{FF2B5EF4-FFF2-40B4-BE49-F238E27FC236}">
+                <a16:creationId xmlns:a16="http://schemas.microsoft.com/office/drawing/2014/main" id="{430857A5-717D-49A9-8279-7D39E3BE8E42}"/>
+              </a:ext>
+            </a:extLst>
+          </p:cNvPr>
+          <p:cNvSpPr/>
+          <p:nvPr/>
+        </p:nvSpPr>
+        <p:spPr>
+          <a:xfrm>
+            <a:off x="7936408" y="550089"/>
+            <a:ext cx="2573690" cy="1608373"/>
+          </a:xfrm>
+          <a:prstGeom prst="rect">
+            <a:avLst/>
+          </a:prstGeom>
+          <a:solidFill>
+            <a:schemeClr val="accent1"/>
+          </a:solidFill>
+          <a:ln>
+            <a:solidFill>
+              <a:schemeClr val="accent1"/>
+            </a:solidFill>
+          </a:ln>
+        </p:spPr>
+        <p:style>
+          <a:lnRef idx="2">
+            <a:schemeClr val="accent5">
+              <a:shade val="50000"/>
+            </a:schemeClr>
+          </a:lnRef>
+          <a:fillRef idx="1">
+            <a:schemeClr val="accent5"/>
+          </a:fillRef>
+          <a:effectRef idx="0">
+            <a:schemeClr val="accent5"/>
+          </a:effectRef>
+          <a:fontRef idx="minor">
+            <a:schemeClr val="lt1"/>
+          </a:fontRef>
+        </p:style>
+        <p:txBody>
+          <a:bodyPr rtlCol="0" anchor="ctr"/>
+          <a:lstStyle>
+            <a:defPPr>
+              <a:defRPr lang="pt-BR"/>
+            </a:defPPr>
+            <a:lvl1pPr marL="0" algn="l" defTabSz="1043056" rtl="0" eaLnBrk="1" latinLnBrk="0" hangingPunct="1">
+              <a:defRPr sz="2100" kern="1200">
+                <a:solidFill>
+                  <a:schemeClr val="lt1"/>
+                </a:solidFill>
+                <a:latin typeface="+mn-lt"/>
+                <a:ea typeface="+mn-ea"/>
+                <a:cs typeface="+mn-cs"/>
+              </a:defRPr>
+            </a:lvl1pPr>
+            <a:lvl2pPr marL="521528" algn="l" defTabSz="1043056" rtl="0" eaLnBrk="1" latinLnBrk="0" hangingPunct="1">
+              <a:defRPr sz="2100" kern="1200">
+                <a:solidFill>
+                  <a:schemeClr val="lt1"/>
+                </a:solidFill>
+                <a:latin typeface="+mn-lt"/>
+                <a:ea typeface="+mn-ea"/>
+                <a:cs typeface="+mn-cs"/>
+              </a:defRPr>
+            </a:lvl2pPr>
+            <a:lvl3pPr marL="1043056" algn="l" defTabSz="1043056" rtl="0" eaLnBrk="1" latinLnBrk="0" hangingPunct="1">
+              <a:defRPr sz="2100" kern="1200">
+                <a:solidFill>
+                  <a:schemeClr val="lt1"/>
+                </a:solidFill>
+                <a:latin typeface="+mn-lt"/>
+                <a:ea typeface="+mn-ea"/>
+                <a:cs typeface="+mn-cs"/>
+              </a:defRPr>
+            </a:lvl3pPr>
+            <a:lvl4pPr marL="1564584" algn="l" defTabSz="1043056" rtl="0" eaLnBrk="1" latinLnBrk="0" hangingPunct="1">
+              <a:defRPr sz="2100" kern="1200">
+                <a:solidFill>
+                  <a:schemeClr val="lt1"/>
+                </a:solidFill>
+                <a:latin typeface="+mn-lt"/>
+                <a:ea typeface="+mn-ea"/>
+                <a:cs typeface="+mn-cs"/>
+              </a:defRPr>
+            </a:lvl4pPr>
+            <a:lvl5pPr marL="2086112" algn="l" defTabSz="1043056" rtl="0" eaLnBrk="1" latinLnBrk="0" hangingPunct="1">
+              <a:defRPr sz="2100" kern="1200">
+                <a:solidFill>
+                  <a:schemeClr val="lt1"/>
+                </a:solidFill>
+                <a:latin typeface="+mn-lt"/>
+                <a:ea typeface="+mn-ea"/>
+                <a:cs typeface="+mn-cs"/>
+              </a:defRPr>
+            </a:lvl5pPr>
+            <a:lvl6pPr marL="2607640" algn="l" defTabSz="1043056" rtl="0" eaLnBrk="1" latinLnBrk="0" hangingPunct="1">
+              <a:defRPr sz="2100" kern="1200">
+                <a:solidFill>
+                  <a:schemeClr val="lt1"/>
+                </a:solidFill>
+                <a:latin typeface="+mn-lt"/>
+                <a:ea typeface="+mn-ea"/>
+                <a:cs typeface="+mn-cs"/>
+              </a:defRPr>
+            </a:lvl6pPr>
+            <a:lvl7pPr marL="3129168" algn="l" defTabSz="1043056" rtl="0" eaLnBrk="1" latinLnBrk="0" hangingPunct="1">
+              <a:defRPr sz="2100" kern="1200">
+                <a:solidFill>
+                  <a:schemeClr val="lt1"/>
+                </a:solidFill>
+                <a:latin typeface="+mn-lt"/>
+                <a:ea typeface="+mn-ea"/>
+                <a:cs typeface="+mn-cs"/>
+              </a:defRPr>
+            </a:lvl7pPr>
+            <a:lvl8pPr marL="3650696" algn="l" defTabSz="1043056" rtl="0" eaLnBrk="1" latinLnBrk="0" hangingPunct="1">
+              <a:defRPr sz="2100" kern="1200">
+                <a:solidFill>
+                  <a:schemeClr val="lt1"/>
+                </a:solidFill>
+                <a:latin typeface="+mn-lt"/>
+                <a:ea typeface="+mn-ea"/>
+                <a:cs typeface="+mn-cs"/>
+              </a:defRPr>
+            </a:lvl8pPr>
+            <a:lvl9pPr marL="4172224" algn="l" defTabSz="1043056" rtl="0" eaLnBrk="1" latinLnBrk="0" hangingPunct="1">
+              <a:defRPr sz="2100" kern="1200">
+                <a:solidFill>
+                  <a:schemeClr val="lt1"/>
+                </a:solidFill>
+                <a:latin typeface="+mn-lt"/>
+                <a:ea typeface="+mn-ea"/>
+                <a:cs typeface="+mn-cs"/>
+              </a:defRPr>
+            </a:lvl9pPr>
+          </a:lstStyle>
+          <a:p>
+            <a:pPr algn="ctr"/>
+            <a:endParaRPr lang="pt-BR" sz="1800" dirty="0"/>
+          </a:p>
+          <a:p>
+            <a:pPr algn="ctr"/>
+            <a:r>
+              <a:rPr lang="pt-BR" sz="1800" b="1" dirty="0" err="1">
+                <a:solidFill>
+                  <a:prstClr val="white"/>
+                </a:solidFill>
+                <a:latin typeface="Corbel" panose="020B0503020204020204" pitchFamily="34" charset="0"/>
+              </a:rPr>
+              <a:t>Microservice</a:t>
+            </a:r>
+            <a:endParaRPr lang="pt-BR" sz="1800" dirty="0">
+              <a:latin typeface="Corbel" panose="020B0503020204020204" pitchFamily="34" charset="0"/>
+            </a:endParaRPr>
+          </a:p>
+          <a:p>
+            <a:pPr algn="ctr"/>
+            <a:r>
+              <a:rPr lang="pt-BR" sz="1600" dirty="0">
+                <a:latin typeface="Corbel" panose="020B0503020204020204" pitchFamily="34" charset="0"/>
+              </a:rPr>
+              <a:t>[Container: Spring Boot]</a:t>
+            </a:r>
+          </a:p>
+          <a:p>
+            <a:pPr algn="ctr"/>
+            <a:endParaRPr lang="pt-BR" sz="1600" dirty="0">
+              <a:latin typeface="Corbel" panose="020B0503020204020204" pitchFamily="34" charset="0"/>
+            </a:endParaRPr>
+          </a:p>
+          <a:p>
+            <a:pPr algn="ctr"/>
+            <a:r>
+              <a:rPr lang="pt-BR" sz="1800" dirty="0">
+                <a:latin typeface="Corbel" panose="020B0503020204020204" pitchFamily="34" charset="0"/>
+              </a:rPr>
+              <a:t>Buscar, inserir e autenticar dados</a:t>
+            </a:r>
+          </a:p>
+          <a:p>
+            <a:pPr algn="ctr"/>
+            <a:endParaRPr lang="pt-BR" sz="1800" dirty="0">
+              <a:solidFill>
+                <a:prstClr val="white"/>
+              </a:solidFill>
+              <a:latin typeface="Calibri"/>
+            </a:endParaRPr>
+          </a:p>
+        </p:txBody>
+      </p:sp>
+      <p:sp>
+        <p:nvSpPr>
+          <p:cNvPr id="4" name="Retângulo 3">
+            <a:extLst>
+              <a:ext uri="{FF2B5EF4-FFF2-40B4-BE49-F238E27FC236}">
+                <a16:creationId xmlns:a16="http://schemas.microsoft.com/office/drawing/2014/main" id="{5322E94A-7F6D-40AF-838F-36D98EC094B9}"/>
+              </a:ext>
+            </a:extLst>
+          </p:cNvPr>
+          <p:cNvSpPr/>
+          <p:nvPr/>
+        </p:nvSpPr>
+        <p:spPr>
+          <a:xfrm>
+            <a:off x="8981141" y="2607801"/>
+            <a:ext cx="2573690" cy="1692234"/>
+          </a:xfrm>
+          <a:prstGeom prst="rect">
+            <a:avLst/>
+          </a:prstGeom>
+          <a:solidFill>
+            <a:schemeClr val="accent1"/>
+          </a:solidFill>
+          <a:ln>
+            <a:solidFill>
+              <a:schemeClr val="accent1"/>
+            </a:solidFill>
+          </a:ln>
+        </p:spPr>
+        <p:style>
+          <a:lnRef idx="2">
+            <a:schemeClr val="accent5">
+              <a:shade val="50000"/>
+            </a:schemeClr>
+          </a:lnRef>
+          <a:fillRef idx="1">
+            <a:schemeClr val="accent5"/>
+          </a:fillRef>
+          <a:effectRef idx="0">
+            <a:schemeClr val="accent5"/>
+          </a:effectRef>
+          <a:fontRef idx="minor">
+            <a:schemeClr val="lt1"/>
+          </a:fontRef>
+        </p:style>
+        <p:txBody>
+          <a:bodyPr rtlCol="0" anchor="ctr"/>
+          <a:lstStyle>
+            <a:defPPr>
+              <a:defRPr lang="pt-BR"/>
+            </a:defPPr>
+            <a:lvl1pPr marL="0" algn="l" defTabSz="1043056" rtl="0" eaLnBrk="1" latinLnBrk="0" hangingPunct="1">
+              <a:defRPr sz="2100" kern="1200">
+                <a:solidFill>
+                  <a:schemeClr val="lt1"/>
+                </a:solidFill>
+                <a:latin typeface="+mn-lt"/>
+                <a:ea typeface="+mn-ea"/>
+                <a:cs typeface="+mn-cs"/>
+              </a:defRPr>
+            </a:lvl1pPr>
+            <a:lvl2pPr marL="521528" algn="l" defTabSz="1043056" rtl="0" eaLnBrk="1" latinLnBrk="0" hangingPunct="1">
+              <a:defRPr sz="2100" kern="1200">
+                <a:solidFill>
+                  <a:schemeClr val="lt1"/>
+                </a:solidFill>
+                <a:latin typeface="+mn-lt"/>
+                <a:ea typeface="+mn-ea"/>
+                <a:cs typeface="+mn-cs"/>
+              </a:defRPr>
+            </a:lvl2pPr>
+            <a:lvl3pPr marL="1043056" algn="l" defTabSz="1043056" rtl="0" eaLnBrk="1" latinLnBrk="0" hangingPunct="1">
+              <a:defRPr sz="2100" kern="1200">
+                <a:solidFill>
+                  <a:schemeClr val="lt1"/>
+                </a:solidFill>
+                <a:latin typeface="+mn-lt"/>
+                <a:ea typeface="+mn-ea"/>
+                <a:cs typeface="+mn-cs"/>
+              </a:defRPr>
+            </a:lvl3pPr>
+            <a:lvl4pPr marL="1564584" algn="l" defTabSz="1043056" rtl="0" eaLnBrk="1" latinLnBrk="0" hangingPunct="1">
+              <a:defRPr sz="2100" kern="1200">
+                <a:solidFill>
+                  <a:schemeClr val="lt1"/>
+                </a:solidFill>
+                <a:latin typeface="+mn-lt"/>
+                <a:ea typeface="+mn-ea"/>
+                <a:cs typeface="+mn-cs"/>
+              </a:defRPr>
+            </a:lvl4pPr>
+            <a:lvl5pPr marL="2086112" algn="l" defTabSz="1043056" rtl="0" eaLnBrk="1" latinLnBrk="0" hangingPunct="1">
+              <a:defRPr sz="2100" kern="1200">
+                <a:solidFill>
+                  <a:schemeClr val="lt1"/>
+                </a:solidFill>
+                <a:latin typeface="+mn-lt"/>
+                <a:ea typeface="+mn-ea"/>
+                <a:cs typeface="+mn-cs"/>
+              </a:defRPr>
+            </a:lvl5pPr>
+            <a:lvl6pPr marL="2607640" algn="l" defTabSz="1043056" rtl="0" eaLnBrk="1" latinLnBrk="0" hangingPunct="1">
+              <a:defRPr sz="2100" kern="1200">
+                <a:solidFill>
+                  <a:schemeClr val="lt1"/>
+                </a:solidFill>
+                <a:latin typeface="+mn-lt"/>
+                <a:ea typeface="+mn-ea"/>
+                <a:cs typeface="+mn-cs"/>
+              </a:defRPr>
+            </a:lvl6pPr>
+            <a:lvl7pPr marL="3129168" algn="l" defTabSz="1043056" rtl="0" eaLnBrk="1" latinLnBrk="0" hangingPunct="1">
+              <a:defRPr sz="2100" kern="1200">
+                <a:solidFill>
+                  <a:schemeClr val="lt1"/>
+                </a:solidFill>
+                <a:latin typeface="+mn-lt"/>
+                <a:ea typeface="+mn-ea"/>
+                <a:cs typeface="+mn-cs"/>
+              </a:defRPr>
+            </a:lvl7pPr>
+            <a:lvl8pPr marL="3650696" algn="l" defTabSz="1043056" rtl="0" eaLnBrk="1" latinLnBrk="0" hangingPunct="1">
+              <a:defRPr sz="2100" kern="1200">
+                <a:solidFill>
+                  <a:schemeClr val="lt1"/>
+                </a:solidFill>
+                <a:latin typeface="+mn-lt"/>
+                <a:ea typeface="+mn-ea"/>
+                <a:cs typeface="+mn-cs"/>
+              </a:defRPr>
+            </a:lvl8pPr>
+            <a:lvl9pPr marL="4172224" algn="l" defTabSz="1043056" rtl="0" eaLnBrk="1" latinLnBrk="0" hangingPunct="1">
+              <a:defRPr sz="2100" kern="1200">
+                <a:solidFill>
+                  <a:schemeClr val="lt1"/>
+                </a:solidFill>
+                <a:latin typeface="+mn-lt"/>
+                <a:ea typeface="+mn-ea"/>
+                <a:cs typeface="+mn-cs"/>
+              </a:defRPr>
+            </a:lvl9pPr>
+          </a:lstStyle>
+          <a:p>
+            <a:pPr algn="ctr"/>
+            <a:endParaRPr lang="pt-BR" sz="1800" dirty="0"/>
+          </a:p>
+          <a:p>
+            <a:pPr algn="ctr"/>
+            <a:r>
+              <a:rPr lang="pt-BR" sz="1800" b="1" dirty="0" err="1">
+                <a:solidFill>
+                  <a:prstClr val="white"/>
+                </a:solidFill>
+                <a:latin typeface="Corbel" panose="020B0503020204020204" pitchFamily="34" charset="0"/>
+              </a:rPr>
+              <a:t>ClientSide</a:t>
+            </a:r>
+            <a:r>
+              <a:rPr lang="pt-BR" sz="1800" b="1" dirty="0">
+                <a:solidFill>
+                  <a:prstClr val="white"/>
+                </a:solidFill>
+                <a:latin typeface="Corbel" panose="020B0503020204020204" pitchFamily="34" charset="0"/>
+              </a:rPr>
+              <a:t> Web</a:t>
+            </a:r>
+            <a:endParaRPr lang="pt-BR" sz="1800" dirty="0">
+              <a:latin typeface="Corbel" panose="020B0503020204020204" pitchFamily="34" charset="0"/>
+            </a:endParaRPr>
+          </a:p>
+          <a:p>
+            <a:pPr algn="ctr"/>
+            <a:r>
+              <a:rPr lang="pt-BR" sz="1600" dirty="0">
+                <a:latin typeface="Corbel" panose="020B0503020204020204" pitchFamily="34" charset="0"/>
+              </a:rPr>
+              <a:t>[Container: </a:t>
+            </a:r>
+            <a:r>
+              <a:rPr lang="pt-BR" sz="1600" dirty="0" err="1">
+                <a:latin typeface="Corbel" panose="020B0503020204020204" pitchFamily="34" charset="0"/>
+              </a:rPr>
+              <a:t>ReactJs</a:t>
+            </a:r>
+            <a:r>
+              <a:rPr lang="pt-BR" sz="1600" dirty="0">
+                <a:latin typeface="Corbel" panose="020B0503020204020204" pitchFamily="34" charset="0"/>
+              </a:rPr>
+              <a:t>]</a:t>
+            </a:r>
+          </a:p>
+          <a:p>
+            <a:pPr algn="ctr"/>
+            <a:endParaRPr lang="pt-BR" sz="1600" dirty="0">
+              <a:latin typeface="Corbel" panose="020B0503020204020204" pitchFamily="34" charset="0"/>
+            </a:endParaRPr>
+          </a:p>
+          <a:p>
+            <a:pPr algn="ctr"/>
+            <a:r>
+              <a:rPr lang="pt-BR" sz="1800" dirty="0">
+                <a:latin typeface="Corbel" panose="020B0503020204020204" pitchFamily="34" charset="0"/>
+              </a:rPr>
+              <a:t>Alugar e disponibilizar garagens</a:t>
+            </a:r>
+          </a:p>
+          <a:p>
+            <a:pPr algn="ctr"/>
+            <a:endParaRPr lang="pt-BR" sz="1800" dirty="0">
+              <a:solidFill>
+                <a:prstClr val="white"/>
+              </a:solidFill>
+              <a:latin typeface="Calibri"/>
+            </a:endParaRPr>
+          </a:p>
+        </p:txBody>
+      </p:sp>
+      <p:sp>
+        <p:nvSpPr>
+          <p:cNvPr id="5" name="Retângulo 4">
+            <a:extLst>
+              <a:ext uri="{FF2B5EF4-FFF2-40B4-BE49-F238E27FC236}">
+                <a16:creationId xmlns:a16="http://schemas.microsoft.com/office/drawing/2014/main" id="{F90DF376-EF81-47E4-84DF-31B5CB2302EB}"/>
+              </a:ext>
+            </a:extLst>
+          </p:cNvPr>
+          <p:cNvSpPr/>
+          <p:nvPr/>
+        </p:nvSpPr>
+        <p:spPr>
+          <a:xfrm>
+            <a:off x="6096000" y="2607801"/>
+            <a:ext cx="2573690" cy="1692234"/>
+          </a:xfrm>
+          <a:prstGeom prst="rect">
+            <a:avLst/>
+          </a:prstGeom>
+          <a:solidFill>
+            <a:schemeClr val="accent1"/>
+          </a:solidFill>
+          <a:ln>
+            <a:solidFill>
+              <a:schemeClr val="accent1"/>
+            </a:solidFill>
+          </a:ln>
+        </p:spPr>
+        <p:style>
+          <a:lnRef idx="2">
+            <a:schemeClr val="accent5">
+              <a:shade val="50000"/>
+            </a:schemeClr>
+          </a:lnRef>
+          <a:fillRef idx="1">
+            <a:schemeClr val="accent5"/>
+          </a:fillRef>
+          <a:effectRef idx="0">
+            <a:schemeClr val="accent5"/>
+          </a:effectRef>
+          <a:fontRef idx="minor">
+            <a:schemeClr val="lt1"/>
+          </a:fontRef>
+        </p:style>
+        <p:txBody>
+          <a:bodyPr rtlCol="0" anchor="ctr"/>
+          <a:lstStyle>
+            <a:defPPr>
+              <a:defRPr lang="pt-BR"/>
+            </a:defPPr>
+            <a:lvl1pPr marL="0" algn="l" defTabSz="1043056" rtl="0" eaLnBrk="1" latinLnBrk="0" hangingPunct="1">
+              <a:defRPr sz="2100" kern="1200">
+                <a:solidFill>
+                  <a:schemeClr val="lt1"/>
+                </a:solidFill>
+                <a:latin typeface="+mn-lt"/>
+                <a:ea typeface="+mn-ea"/>
+                <a:cs typeface="+mn-cs"/>
+              </a:defRPr>
+            </a:lvl1pPr>
+            <a:lvl2pPr marL="521528" algn="l" defTabSz="1043056" rtl="0" eaLnBrk="1" latinLnBrk="0" hangingPunct="1">
+              <a:defRPr sz="2100" kern="1200">
+                <a:solidFill>
+                  <a:schemeClr val="lt1"/>
+                </a:solidFill>
+                <a:latin typeface="+mn-lt"/>
+                <a:ea typeface="+mn-ea"/>
+                <a:cs typeface="+mn-cs"/>
+              </a:defRPr>
+            </a:lvl2pPr>
+            <a:lvl3pPr marL="1043056" algn="l" defTabSz="1043056" rtl="0" eaLnBrk="1" latinLnBrk="0" hangingPunct="1">
+              <a:defRPr sz="2100" kern="1200">
+                <a:solidFill>
+                  <a:schemeClr val="lt1"/>
+                </a:solidFill>
+                <a:latin typeface="+mn-lt"/>
+                <a:ea typeface="+mn-ea"/>
+                <a:cs typeface="+mn-cs"/>
+              </a:defRPr>
+            </a:lvl3pPr>
+            <a:lvl4pPr marL="1564584" algn="l" defTabSz="1043056" rtl="0" eaLnBrk="1" latinLnBrk="0" hangingPunct="1">
+              <a:defRPr sz="2100" kern="1200">
+                <a:solidFill>
+                  <a:schemeClr val="lt1"/>
+                </a:solidFill>
+                <a:latin typeface="+mn-lt"/>
+                <a:ea typeface="+mn-ea"/>
+                <a:cs typeface="+mn-cs"/>
+              </a:defRPr>
+            </a:lvl4pPr>
+            <a:lvl5pPr marL="2086112" algn="l" defTabSz="1043056" rtl="0" eaLnBrk="1" latinLnBrk="0" hangingPunct="1">
+              <a:defRPr sz="2100" kern="1200">
+                <a:solidFill>
+                  <a:schemeClr val="lt1"/>
+                </a:solidFill>
+                <a:latin typeface="+mn-lt"/>
+                <a:ea typeface="+mn-ea"/>
+                <a:cs typeface="+mn-cs"/>
+              </a:defRPr>
+            </a:lvl5pPr>
+            <a:lvl6pPr marL="2607640" algn="l" defTabSz="1043056" rtl="0" eaLnBrk="1" latinLnBrk="0" hangingPunct="1">
+              <a:defRPr sz="2100" kern="1200">
+                <a:solidFill>
+                  <a:schemeClr val="lt1"/>
+                </a:solidFill>
+                <a:latin typeface="+mn-lt"/>
+                <a:ea typeface="+mn-ea"/>
+                <a:cs typeface="+mn-cs"/>
+              </a:defRPr>
+            </a:lvl6pPr>
+            <a:lvl7pPr marL="3129168" algn="l" defTabSz="1043056" rtl="0" eaLnBrk="1" latinLnBrk="0" hangingPunct="1">
+              <a:defRPr sz="2100" kern="1200">
+                <a:solidFill>
+                  <a:schemeClr val="lt1"/>
+                </a:solidFill>
+                <a:latin typeface="+mn-lt"/>
+                <a:ea typeface="+mn-ea"/>
+                <a:cs typeface="+mn-cs"/>
+              </a:defRPr>
+            </a:lvl7pPr>
+            <a:lvl8pPr marL="3650696" algn="l" defTabSz="1043056" rtl="0" eaLnBrk="1" latinLnBrk="0" hangingPunct="1">
+              <a:defRPr sz="2100" kern="1200">
+                <a:solidFill>
+                  <a:schemeClr val="lt1"/>
+                </a:solidFill>
+                <a:latin typeface="+mn-lt"/>
+                <a:ea typeface="+mn-ea"/>
+                <a:cs typeface="+mn-cs"/>
+              </a:defRPr>
+            </a:lvl8pPr>
+            <a:lvl9pPr marL="4172224" algn="l" defTabSz="1043056" rtl="0" eaLnBrk="1" latinLnBrk="0" hangingPunct="1">
+              <a:defRPr sz="2100" kern="1200">
+                <a:solidFill>
+                  <a:schemeClr val="lt1"/>
+                </a:solidFill>
+                <a:latin typeface="+mn-lt"/>
+                <a:ea typeface="+mn-ea"/>
+                <a:cs typeface="+mn-cs"/>
+              </a:defRPr>
+            </a:lvl9pPr>
+          </a:lstStyle>
+          <a:p>
+            <a:pPr algn="ctr"/>
+            <a:endParaRPr lang="pt-BR" sz="1800" dirty="0"/>
+          </a:p>
+          <a:p>
+            <a:pPr algn="ctr"/>
+            <a:r>
+              <a:rPr lang="pt-BR" sz="1800" b="1" dirty="0">
+                <a:solidFill>
+                  <a:prstClr val="white"/>
+                </a:solidFill>
+                <a:latin typeface="Corbel" panose="020B0503020204020204" pitchFamily="34" charset="0"/>
+              </a:rPr>
+              <a:t>Aplicação Mobile</a:t>
+            </a:r>
+            <a:endParaRPr lang="pt-BR" sz="1800" dirty="0">
+              <a:latin typeface="Corbel" panose="020B0503020204020204" pitchFamily="34" charset="0"/>
+            </a:endParaRPr>
+          </a:p>
+          <a:p>
+            <a:pPr algn="ctr"/>
+            <a:r>
+              <a:rPr lang="pt-BR" sz="1600" dirty="0">
+                <a:latin typeface="Corbel" panose="020B0503020204020204" pitchFamily="34" charset="0"/>
+              </a:rPr>
+              <a:t>[Container: </a:t>
+            </a:r>
+            <a:r>
+              <a:rPr lang="pt-BR" sz="1600" dirty="0" err="1">
+                <a:latin typeface="Corbel" panose="020B0503020204020204" pitchFamily="34" charset="0"/>
+              </a:rPr>
+              <a:t>Kotlin</a:t>
+            </a:r>
+            <a:r>
+              <a:rPr lang="pt-BR" sz="1600" dirty="0">
+                <a:latin typeface="Corbel" panose="020B0503020204020204" pitchFamily="34" charset="0"/>
+              </a:rPr>
+              <a:t>]</a:t>
+            </a:r>
+          </a:p>
+          <a:p>
+            <a:pPr algn="ctr"/>
+            <a:endParaRPr lang="pt-BR" sz="1600" dirty="0">
+              <a:latin typeface="Corbel" panose="020B0503020204020204" pitchFamily="34" charset="0"/>
+            </a:endParaRPr>
+          </a:p>
+          <a:p>
+            <a:pPr algn="ctr"/>
+            <a:r>
+              <a:rPr lang="pt-BR" sz="1800" dirty="0">
+                <a:latin typeface="Corbel" panose="020B0503020204020204" pitchFamily="34" charset="0"/>
+              </a:rPr>
+              <a:t>Alugar e disponibilizar garagens</a:t>
+            </a:r>
+          </a:p>
+          <a:p>
+            <a:pPr algn="ctr"/>
+            <a:endParaRPr lang="pt-BR" sz="1800" dirty="0">
+              <a:solidFill>
+                <a:prstClr val="white"/>
+              </a:solidFill>
+              <a:latin typeface="Calibri"/>
+            </a:endParaRPr>
+          </a:p>
+        </p:txBody>
+      </p:sp>
       <p:cxnSp>
         <p:nvCxnSpPr>
-          <p:cNvPr id="23" name="Conector de Seta Reta 22">
-            <a:extLst>
-              <a:ext uri="{FF2B5EF4-FFF2-40B4-BE49-F238E27FC236}">
-                <a16:creationId xmlns:a16="http://schemas.microsoft.com/office/drawing/2014/main" id="{1E16ED41-B4B1-4C57-96C0-EF0EC9595073}"/>
+          <p:cNvPr id="25" name="Conector: Angulado 24">
+            <a:extLst>
+              <a:ext uri="{FF2B5EF4-FFF2-40B4-BE49-F238E27FC236}">
+                <a16:creationId xmlns:a16="http://schemas.microsoft.com/office/drawing/2014/main" id="{AEC42328-F2CF-4178-98E4-325FA5136B15}"/>
               </a:ext>
             </a:extLst>
           </p:cNvPr>
           <p:cNvCxnSpPr>
             <a:cxnSpLocks/>
-            <a:stCxn id="9" idx="1"/>
+            <a:stCxn id="5" idx="0"/>
+            <a:endCxn id="3" idx="2"/>
           </p:cNvCxnSpPr>
           <p:nvPr/>
         </p:nvCxnSpPr>
         <p:spPr>
-          <a:xfrm flipH="1" flipV="1">
-            <a:off x="4110361" y="1529815"/>
-            <a:ext cx="2203021" cy="159209"/>
+          <a:xfrm rot="5400000" flipH="1" flipV="1">
+            <a:off x="8078380" y="1462928"/>
+            <a:ext cx="449339" cy="1840408"/>
           </a:xfrm>
-          <a:prstGeom prst="straightConnector1">
-            <a:avLst/>
+          <a:prstGeom prst="bentConnector3">
+            <a:avLst>
+              <a:gd name="adj1" fmla="val 50000"/>
+            </a:avLst>
           </a:prstGeom>
-          <a:ln w="28575">
+          <a:ln w="38100">
+            <a:solidFill>
+              <a:schemeClr val="accent1">
+                <a:lumMod val="50000"/>
+              </a:schemeClr>
+            </a:solidFill>
+            <a:prstDash val="sysDash"/>
             <a:tailEnd type="triangle"/>
           </a:ln>
         </p:spPr>
@@ -4033,28 +4440,38 @@
       </p:cxnSp>
       <p:cxnSp>
         <p:nvCxnSpPr>
-          <p:cNvPr id="24" name="Conector de Seta Reta 23">
-            <a:extLst>
-              <a:ext uri="{FF2B5EF4-FFF2-40B4-BE49-F238E27FC236}">
-                <a16:creationId xmlns:a16="http://schemas.microsoft.com/office/drawing/2014/main" id="{8E492D1E-89BE-4058-B84F-25C73463D110}"/>
+          <p:cNvPr id="27" name="Conector: Angulado 26">
+            <a:extLst>
+              <a:ext uri="{FF2B5EF4-FFF2-40B4-BE49-F238E27FC236}">
+                <a16:creationId xmlns:a16="http://schemas.microsoft.com/office/drawing/2014/main" id="{1DAB370C-6FC9-4C2B-86A4-DC9CFDE03F41}"/>
               </a:ext>
             </a:extLst>
           </p:cNvPr>
           <p:cNvCxnSpPr>
             <a:cxnSpLocks/>
-            <a:endCxn id="7" idx="0"/>
+            <a:stCxn id="4" idx="0"/>
+            <a:endCxn id="3" idx="3"/>
           </p:cNvCxnSpPr>
           <p:nvPr/>
         </p:nvCxnSpPr>
         <p:spPr>
-          <a:xfrm flipH="1">
-            <a:off x="6540736" y="2619990"/>
-            <a:ext cx="1149746" cy="1070007"/>
+          <a:xfrm rot="5400000" flipH="1" flipV="1">
+            <a:off x="9762280" y="1859983"/>
+            <a:ext cx="1253525" cy="242112"/>
           </a:xfrm>
-          <a:prstGeom prst="straightConnector1">
-            <a:avLst/>
+          <a:prstGeom prst="bentConnector4">
+            <a:avLst>
+              <a:gd name="adj1" fmla="val 17923"/>
+              <a:gd name="adj2" fmla="val 194419"/>
+            </a:avLst>
           </a:prstGeom>
-          <a:ln w="28575">
+          <a:ln w="38100">
+            <a:solidFill>
+              <a:schemeClr val="accent1">
+                <a:lumMod val="50000"/>
+              </a:schemeClr>
+            </a:solidFill>
+            <a:prstDash val="sysDash"/>
             <a:tailEnd type="triangle"/>
           </a:ln>
         </p:spPr>
@@ -4075,27 +4492,126 @@
       </p:cxnSp>
       <p:cxnSp>
         <p:nvCxnSpPr>
-          <p:cNvPr id="31" name="Conector de Seta Reta 30">
-            <a:extLst>
-              <a:ext uri="{FF2B5EF4-FFF2-40B4-BE49-F238E27FC236}">
-                <a16:creationId xmlns:a16="http://schemas.microsoft.com/office/drawing/2014/main" id="{383D33CB-9039-409A-9752-4CCDDEA5081D}"/>
+          <p:cNvPr id="30" name="Conector: Angulado 29">
+            <a:extLst>
+              <a:ext uri="{FF2B5EF4-FFF2-40B4-BE49-F238E27FC236}">
+                <a16:creationId xmlns:a16="http://schemas.microsoft.com/office/drawing/2014/main" id="{8C76179F-D658-4941-91F4-5C1B089F5590}"/>
               </a:ext>
             </a:extLst>
           </p:cNvPr>
           <p:cNvCxnSpPr>
             <a:cxnSpLocks/>
+            <a:stCxn id="3" idx="1"/>
+            <a:endCxn id="8" idx="2"/>
           </p:cNvCxnSpPr>
           <p:nvPr/>
         </p:nvCxnSpPr>
         <p:spPr>
+          <a:xfrm rot="10800000" flipV="1">
+            <a:off x="4110362" y="1354275"/>
+            <a:ext cx="3826047" cy="214445"/>
+          </a:xfrm>
+          <a:prstGeom prst="bentConnector3">
+            <a:avLst>
+              <a:gd name="adj1" fmla="val 50000"/>
+            </a:avLst>
+          </a:prstGeom>
+          <a:ln w="38100">
+            <a:solidFill>
+              <a:schemeClr val="accent1">
+                <a:lumMod val="50000"/>
+              </a:schemeClr>
+            </a:solidFill>
+            <a:prstDash val="sysDash"/>
+            <a:tailEnd type="triangle"/>
+          </a:ln>
+        </p:spPr>
+        <p:style>
+          <a:lnRef idx="1">
+            <a:schemeClr val="accent1"/>
+          </a:lnRef>
+          <a:fillRef idx="0">
+            <a:schemeClr val="accent1"/>
+          </a:fillRef>
+          <a:effectRef idx="0">
+            <a:schemeClr val="accent1"/>
+          </a:effectRef>
+          <a:fontRef idx="minor">
+            <a:schemeClr val="tx1"/>
+          </a:fontRef>
+        </p:style>
+      </p:cxnSp>
+      <p:sp>
+        <p:nvSpPr>
+          <p:cNvPr id="38" name="CaixaDeTexto 37">
+            <a:extLst>
+              <a:ext uri="{FF2B5EF4-FFF2-40B4-BE49-F238E27FC236}">
+                <a16:creationId xmlns:a16="http://schemas.microsoft.com/office/drawing/2014/main" id="{3D1106A7-3275-4FAB-8457-6F324BEF83A3}"/>
+              </a:ext>
+            </a:extLst>
+          </p:cNvPr>
+          <p:cNvSpPr txBox="1"/>
+          <p:nvPr/>
+        </p:nvSpPr>
+        <p:spPr>
           <a:xfrm>
-            <a:off x="8898273" y="2619989"/>
-            <a:ext cx="1357628" cy="1102315"/>
+            <a:off x="338287" y="3338291"/>
+            <a:ext cx="4533715" cy="461665"/>
           </a:xfrm>
-          <a:prstGeom prst="straightConnector1">
+          <a:prstGeom prst="rect">
             <a:avLst/>
           </a:prstGeom>
-          <a:ln w="28575">
+          <a:noFill/>
+        </p:spPr>
+        <p:txBody>
+          <a:bodyPr wrap="square" rtlCol="0">
+            <a:spAutoFit/>
+          </a:bodyPr>
+          <a:lstStyle/>
+          <a:p>
+            <a:r>
+              <a:rPr lang="pt-BR" sz="2400" dirty="0" err="1">
+                <a:latin typeface="Corbel" panose="020B0503020204020204" pitchFamily="34" charset="0"/>
+              </a:rPr>
+              <a:t>Firebase</a:t>
+            </a:r>
+            <a:endParaRPr lang="pt-BR" sz="2400" dirty="0">
+              <a:latin typeface="Corbel" panose="020B0503020204020204" pitchFamily="34" charset="0"/>
+            </a:endParaRPr>
+          </a:p>
+        </p:txBody>
+      </p:sp>
+      <p:cxnSp>
+        <p:nvCxnSpPr>
+          <p:cNvPr id="43" name="Conector: Angulado 42">
+            <a:extLst>
+              <a:ext uri="{FF2B5EF4-FFF2-40B4-BE49-F238E27FC236}">
+                <a16:creationId xmlns:a16="http://schemas.microsoft.com/office/drawing/2014/main" id="{5875322F-0616-47D1-90A1-C2138EC9C0DD}"/>
+              </a:ext>
+            </a:extLst>
+          </p:cNvPr>
+          <p:cNvCxnSpPr>
+            <a:cxnSpLocks/>
+            <a:stCxn id="5" idx="1"/>
+            <a:endCxn id="51" idx="0"/>
+          </p:cNvCxnSpPr>
+          <p:nvPr/>
+        </p:nvCxnSpPr>
+        <p:spPr>
+          <a:xfrm rot="10800000" flipV="1">
+            <a:off x="4257890" y="3453917"/>
+            <a:ext cx="1838110" cy="386169"/>
+          </a:xfrm>
+          <a:prstGeom prst="bentConnector2">
+            <a:avLst/>
+          </a:prstGeom>
+          <a:ln w="38100">
+            <a:solidFill>
+              <a:schemeClr val="accent1">
+                <a:lumMod val="50000"/>
+              </a:schemeClr>
+            </a:solidFill>
+            <a:prstDash val="sysDash"/>
             <a:tailEnd type="triangle"/>
           </a:ln>
         </p:spPr>
@@ -4116,28 +4632,35 @@
       </p:cxnSp>
       <p:cxnSp>
         <p:nvCxnSpPr>
-          <p:cNvPr id="42" name="Conector de Seta Reta 41">
-            <a:extLst>
-              <a:ext uri="{FF2B5EF4-FFF2-40B4-BE49-F238E27FC236}">
-                <a16:creationId xmlns:a16="http://schemas.microsoft.com/office/drawing/2014/main" id="{85AA45EF-9268-447C-A5B4-346FFE26AF7E}"/>
+          <p:cNvPr id="45" name="Conector: Angulado 44">
+            <a:extLst>
+              <a:ext uri="{FF2B5EF4-FFF2-40B4-BE49-F238E27FC236}">
+                <a16:creationId xmlns:a16="http://schemas.microsoft.com/office/drawing/2014/main" id="{ABBF6998-79E3-43D2-98AA-914D56D647DD}"/>
               </a:ext>
             </a:extLst>
           </p:cNvPr>
           <p:cNvCxnSpPr>
             <a:cxnSpLocks/>
-            <a:stCxn id="7" idx="1"/>
+            <a:stCxn id="4" idx="2"/>
+            <a:endCxn id="51" idx="3"/>
           </p:cNvCxnSpPr>
           <p:nvPr/>
         </p:nvCxnSpPr>
         <p:spPr>
-          <a:xfrm flipH="1">
-            <a:off x="3229451" y="4620963"/>
-            <a:ext cx="1824553" cy="317865"/>
+          <a:xfrm rot="5400000">
+            <a:off x="7650519" y="2026806"/>
+            <a:ext cx="344239" cy="4890696"/>
           </a:xfrm>
-          <a:prstGeom prst="straightConnector1">
+          <a:prstGeom prst="bentConnector2">
             <a:avLst/>
           </a:prstGeom>
-          <a:ln w="28575">
+          <a:ln w="38100">
+            <a:solidFill>
+              <a:schemeClr val="accent1">
+                <a:lumMod val="50000"/>
+              </a:schemeClr>
+            </a:solidFill>
+            <a:prstDash val="sysDash"/>
             <a:tailEnd type="triangle"/>
           </a:ln>
         </p:spPr>
@@ -4156,30 +4679,244 @@
           </a:fontRef>
         </p:style>
       </p:cxnSp>
+      <p:sp>
+        <p:nvSpPr>
+          <p:cNvPr id="51" name="Retângulo 50">
+            <a:extLst>
+              <a:ext uri="{FF2B5EF4-FFF2-40B4-BE49-F238E27FC236}">
+                <a16:creationId xmlns:a16="http://schemas.microsoft.com/office/drawing/2014/main" id="{F58FB0ED-F2AD-41E4-ABF0-ACE5B3B70087}"/>
+              </a:ext>
+            </a:extLst>
+          </p:cNvPr>
+          <p:cNvSpPr/>
+          <p:nvPr/>
+        </p:nvSpPr>
+        <p:spPr>
+          <a:xfrm>
+            <a:off x="3138490" y="3840087"/>
+            <a:ext cx="2238800" cy="1608373"/>
+          </a:xfrm>
+          <a:prstGeom prst="rect">
+            <a:avLst/>
+          </a:prstGeom>
+          <a:solidFill>
+            <a:schemeClr val="accent1"/>
+          </a:solidFill>
+          <a:ln>
+            <a:solidFill>
+              <a:schemeClr val="accent1"/>
+            </a:solidFill>
+          </a:ln>
+        </p:spPr>
+        <p:style>
+          <a:lnRef idx="2">
+            <a:schemeClr val="accent5">
+              <a:shade val="50000"/>
+            </a:schemeClr>
+          </a:lnRef>
+          <a:fillRef idx="1">
+            <a:schemeClr val="accent5"/>
+          </a:fillRef>
+          <a:effectRef idx="0">
+            <a:schemeClr val="accent5"/>
+          </a:effectRef>
+          <a:fontRef idx="minor">
+            <a:schemeClr val="lt1"/>
+          </a:fontRef>
+        </p:style>
+        <p:txBody>
+          <a:bodyPr rtlCol="0" anchor="ctr"/>
+          <a:lstStyle>
+            <a:defPPr>
+              <a:defRPr lang="pt-BR"/>
+            </a:defPPr>
+            <a:lvl1pPr marL="0" algn="l" defTabSz="1043056" rtl="0" eaLnBrk="1" latinLnBrk="0" hangingPunct="1">
+              <a:defRPr sz="2100" kern="1200">
+                <a:solidFill>
+                  <a:schemeClr val="lt1"/>
+                </a:solidFill>
+                <a:latin typeface="+mn-lt"/>
+                <a:ea typeface="+mn-ea"/>
+                <a:cs typeface="+mn-cs"/>
+              </a:defRPr>
+            </a:lvl1pPr>
+            <a:lvl2pPr marL="521528" algn="l" defTabSz="1043056" rtl="0" eaLnBrk="1" latinLnBrk="0" hangingPunct="1">
+              <a:defRPr sz="2100" kern="1200">
+                <a:solidFill>
+                  <a:schemeClr val="lt1"/>
+                </a:solidFill>
+                <a:latin typeface="+mn-lt"/>
+                <a:ea typeface="+mn-ea"/>
+                <a:cs typeface="+mn-cs"/>
+              </a:defRPr>
+            </a:lvl2pPr>
+            <a:lvl3pPr marL="1043056" algn="l" defTabSz="1043056" rtl="0" eaLnBrk="1" latinLnBrk="0" hangingPunct="1">
+              <a:defRPr sz="2100" kern="1200">
+                <a:solidFill>
+                  <a:schemeClr val="lt1"/>
+                </a:solidFill>
+                <a:latin typeface="+mn-lt"/>
+                <a:ea typeface="+mn-ea"/>
+                <a:cs typeface="+mn-cs"/>
+              </a:defRPr>
+            </a:lvl3pPr>
+            <a:lvl4pPr marL="1564584" algn="l" defTabSz="1043056" rtl="0" eaLnBrk="1" latinLnBrk="0" hangingPunct="1">
+              <a:defRPr sz="2100" kern="1200">
+                <a:solidFill>
+                  <a:schemeClr val="lt1"/>
+                </a:solidFill>
+                <a:latin typeface="+mn-lt"/>
+                <a:ea typeface="+mn-ea"/>
+                <a:cs typeface="+mn-cs"/>
+              </a:defRPr>
+            </a:lvl4pPr>
+            <a:lvl5pPr marL="2086112" algn="l" defTabSz="1043056" rtl="0" eaLnBrk="1" latinLnBrk="0" hangingPunct="1">
+              <a:defRPr sz="2100" kern="1200">
+                <a:solidFill>
+                  <a:schemeClr val="lt1"/>
+                </a:solidFill>
+                <a:latin typeface="+mn-lt"/>
+                <a:ea typeface="+mn-ea"/>
+                <a:cs typeface="+mn-cs"/>
+              </a:defRPr>
+            </a:lvl5pPr>
+            <a:lvl6pPr marL="2607640" algn="l" defTabSz="1043056" rtl="0" eaLnBrk="1" latinLnBrk="0" hangingPunct="1">
+              <a:defRPr sz="2100" kern="1200">
+                <a:solidFill>
+                  <a:schemeClr val="lt1"/>
+                </a:solidFill>
+                <a:latin typeface="+mn-lt"/>
+                <a:ea typeface="+mn-ea"/>
+                <a:cs typeface="+mn-cs"/>
+              </a:defRPr>
+            </a:lvl6pPr>
+            <a:lvl7pPr marL="3129168" algn="l" defTabSz="1043056" rtl="0" eaLnBrk="1" latinLnBrk="0" hangingPunct="1">
+              <a:defRPr sz="2100" kern="1200">
+                <a:solidFill>
+                  <a:schemeClr val="lt1"/>
+                </a:solidFill>
+                <a:latin typeface="+mn-lt"/>
+                <a:ea typeface="+mn-ea"/>
+                <a:cs typeface="+mn-cs"/>
+              </a:defRPr>
+            </a:lvl7pPr>
+            <a:lvl8pPr marL="3650696" algn="l" defTabSz="1043056" rtl="0" eaLnBrk="1" latinLnBrk="0" hangingPunct="1">
+              <a:defRPr sz="2100" kern="1200">
+                <a:solidFill>
+                  <a:schemeClr val="lt1"/>
+                </a:solidFill>
+                <a:latin typeface="+mn-lt"/>
+                <a:ea typeface="+mn-ea"/>
+                <a:cs typeface="+mn-cs"/>
+              </a:defRPr>
+            </a:lvl8pPr>
+            <a:lvl9pPr marL="4172224" algn="l" defTabSz="1043056" rtl="0" eaLnBrk="1" latinLnBrk="0" hangingPunct="1">
+              <a:defRPr sz="2100" kern="1200">
+                <a:solidFill>
+                  <a:schemeClr val="lt1"/>
+                </a:solidFill>
+                <a:latin typeface="+mn-lt"/>
+                <a:ea typeface="+mn-ea"/>
+                <a:cs typeface="+mn-cs"/>
+              </a:defRPr>
+            </a:lvl9pPr>
+          </a:lstStyle>
+          <a:p>
+            <a:pPr algn="ctr"/>
+            <a:endParaRPr lang="pt-BR" sz="1800" dirty="0"/>
+          </a:p>
+          <a:p>
+            <a:pPr algn="ctr"/>
+            <a:r>
+              <a:rPr lang="pt-BR" sz="1800" b="1" dirty="0">
+                <a:solidFill>
+                  <a:prstClr val="white"/>
+                </a:solidFill>
+                <a:latin typeface="Corbel" panose="020B0503020204020204" pitchFamily="34" charset="0"/>
+              </a:rPr>
+              <a:t>API</a:t>
+            </a:r>
+            <a:endParaRPr lang="pt-BR" sz="1800" dirty="0">
+              <a:latin typeface="Corbel" panose="020B0503020204020204" pitchFamily="34" charset="0"/>
+            </a:endParaRPr>
+          </a:p>
+          <a:p>
+            <a:pPr algn="ctr"/>
+            <a:r>
+              <a:rPr lang="pt-BR" sz="1600" dirty="0">
+                <a:latin typeface="Corbel" panose="020B0503020204020204" pitchFamily="34" charset="0"/>
+              </a:rPr>
+              <a:t>[Container: </a:t>
+            </a:r>
+            <a:r>
+              <a:rPr lang="pt-BR" sz="1600" dirty="0" err="1">
+                <a:latin typeface="Corbel" panose="020B0503020204020204" pitchFamily="34" charset="0"/>
+              </a:rPr>
+              <a:t>Firebase</a:t>
+            </a:r>
+            <a:r>
+              <a:rPr lang="pt-BR" sz="1600" dirty="0">
+                <a:latin typeface="Corbel" panose="020B0503020204020204" pitchFamily="34" charset="0"/>
+              </a:rPr>
+              <a:t>]</a:t>
+            </a:r>
+          </a:p>
+          <a:p>
+            <a:pPr algn="ctr"/>
+            <a:endParaRPr lang="pt-BR" sz="1600" dirty="0">
+              <a:latin typeface="Corbel" panose="020B0503020204020204" pitchFamily="34" charset="0"/>
+            </a:endParaRPr>
+          </a:p>
+          <a:p>
+            <a:pPr algn="ctr"/>
+            <a:r>
+              <a:rPr lang="pt-BR" sz="1800" dirty="0">
+                <a:latin typeface="Corbel" panose="020B0503020204020204" pitchFamily="34" charset="0"/>
+              </a:rPr>
+              <a:t>Buscar e autenticar dados do usuário</a:t>
+            </a:r>
+          </a:p>
+          <a:p>
+            <a:pPr algn="ctr"/>
+            <a:endParaRPr lang="pt-BR" sz="1800" dirty="0">
+              <a:solidFill>
+                <a:prstClr val="white"/>
+              </a:solidFill>
+              <a:latin typeface="Calibri"/>
+            </a:endParaRPr>
+          </a:p>
+        </p:txBody>
+      </p:sp>
       <p:cxnSp>
         <p:nvCxnSpPr>
-          <p:cNvPr id="47" name="Conector: Angulado 46">
-            <a:extLst>
-              <a:ext uri="{FF2B5EF4-FFF2-40B4-BE49-F238E27FC236}">
-                <a16:creationId xmlns:a16="http://schemas.microsoft.com/office/drawing/2014/main" id="{A5E0F174-808C-4F0C-969B-623DE4E2F80B}"/>
+          <p:cNvPr id="61" name="Conector: Angulado 60">
+            <a:extLst>
+              <a:ext uri="{FF2B5EF4-FFF2-40B4-BE49-F238E27FC236}">
+                <a16:creationId xmlns:a16="http://schemas.microsoft.com/office/drawing/2014/main" id="{B25DE4E8-1E49-4906-898D-5662D9081743}"/>
               </a:ext>
             </a:extLst>
           </p:cNvPr>
           <p:cNvCxnSpPr>
             <a:cxnSpLocks/>
-            <a:stCxn id="10" idx="2"/>
+            <a:stCxn id="51" idx="2"/>
           </p:cNvCxnSpPr>
           <p:nvPr/>
         </p:nvCxnSpPr>
         <p:spPr>
           <a:xfrm rot="5400000">
-            <a:off x="6268675" y="2541720"/>
-            <a:ext cx="499844" cy="6505553"/>
+            <a:off x="3325408" y="4902148"/>
+            <a:ext cx="386170" cy="1478794"/>
           </a:xfrm>
           <a:prstGeom prst="bentConnector2">
             <a:avLst/>
           </a:prstGeom>
-          <a:ln w="28575">
+          <a:ln w="38100">
+            <a:solidFill>
+              <a:schemeClr val="accent1">
+                <a:lumMod val="50000"/>
+              </a:schemeClr>
+            </a:solidFill>
+            <a:prstDash val="sysDash"/>
             <a:tailEnd type="triangle"/>
           </a:ln>
         </p:spPr>

</xml_diff>